<commit_message>
working on next 3 chapters
</commit_message>
<xml_diff>
--- a/figures/linkedList.pptx
+++ b/figures/linkedList.pptx
@@ -104,6 +104,11 @@
       </a:defRPr>
     </a:lvl9pPr>
   </p:defaultTextStyle>
+  <p:extLst>
+    <p:ext uri="{EFAFB233-063F-42B5-8137-9DF3F51BA10A}">
+      <p15:sldGuideLst xmlns:p15="http://schemas.microsoft.com/office/powerpoint/2012/main"/>
+    </p:ext>
+  </p:extLst>
 </p:presentation>
 </file>
 
@@ -149,7 +154,7 @@
           </a:lstStyle>
           <a:p>
             <a:r>
-              <a:rPr lang="en-US" smtClean="0"/>
+              <a:rPr lang="en-US"/>
               <a:t>Click to edit Master title style</a:t>
             </a:r>
             <a:endParaRPr lang="en-US" dirty="0"/>
@@ -214,7 +219,7 @@
           </a:lstStyle>
           <a:p>
             <a:r>
-              <a:rPr lang="en-US" smtClean="0"/>
+              <a:rPr lang="en-US"/>
               <a:t>Click to edit Master subtitle style</a:t>
             </a:r>
             <a:endParaRPr lang="en-US" dirty="0"/>
@@ -238,7 +243,7 @@
           <a:p>
             <a:fld id="{4094A262-D998-1A4D-AA74-601A2F50E65F}" type="datetimeFigureOut">
               <a:rPr lang="en-US" smtClean="0"/>
-              <a:t>9/29/17</a:t>
+              <a:t>9/19/22</a:t>
             </a:fld>
             <a:endParaRPr lang="en-US"/>
           </a:p>
@@ -327,7 +332,7 @@
           <a:lstStyle/>
           <a:p>
             <a:r>
-              <a:rPr lang="en-US" smtClean="0"/>
+              <a:rPr lang="en-US"/>
               <a:t>Click to edit Master title style</a:t>
             </a:r>
             <a:endParaRPr lang="en-US" dirty="0"/>
@@ -351,35 +356,35 @@
           <a:p>
             <a:pPr lvl="0"/>
             <a:r>
-              <a:rPr lang="en-US" smtClean="0"/>
+              <a:rPr lang="en-US"/>
               <a:t>Click to edit Master text styles</a:t>
             </a:r>
           </a:p>
           <a:p>
             <a:pPr lvl="1"/>
             <a:r>
-              <a:rPr lang="en-US" smtClean="0"/>
+              <a:rPr lang="en-US"/>
               <a:t>Second level</a:t>
             </a:r>
           </a:p>
           <a:p>
             <a:pPr lvl="2"/>
             <a:r>
-              <a:rPr lang="en-US" smtClean="0"/>
+              <a:rPr lang="en-US"/>
               <a:t>Third level</a:t>
             </a:r>
           </a:p>
           <a:p>
             <a:pPr lvl="3"/>
             <a:r>
-              <a:rPr lang="en-US" smtClean="0"/>
+              <a:rPr lang="en-US"/>
               <a:t>Fourth level</a:t>
             </a:r>
           </a:p>
           <a:p>
             <a:pPr lvl="4"/>
             <a:r>
-              <a:rPr lang="en-US" smtClean="0"/>
+              <a:rPr lang="en-US"/>
               <a:t>Fifth level</a:t>
             </a:r>
             <a:endParaRPr lang="en-US" dirty="0"/>
@@ -403,7 +408,7 @@
           <a:p>
             <a:fld id="{4094A262-D998-1A4D-AA74-601A2F50E65F}" type="datetimeFigureOut">
               <a:rPr lang="en-US" smtClean="0"/>
-              <a:t>9/29/17</a:t>
+              <a:t>9/19/22</a:t>
             </a:fld>
             <a:endParaRPr lang="en-US"/>
           </a:p>
@@ -497,7 +502,7 @@
           <a:lstStyle/>
           <a:p>
             <a:r>
-              <a:rPr lang="en-US" smtClean="0"/>
+              <a:rPr lang="en-US"/>
               <a:t>Click to edit Master title style</a:t>
             </a:r>
             <a:endParaRPr lang="en-US" dirty="0"/>
@@ -526,35 +531,35 @@
           <a:p>
             <a:pPr lvl="0"/>
             <a:r>
-              <a:rPr lang="en-US" smtClean="0"/>
+              <a:rPr lang="en-US"/>
               <a:t>Click to edit Master text styles</a:t>
             </a:r>
           </a:p>
           <a:p>
             <a:pPr lvl="1"/>
             <a:r>
-              <a:rPr lang="en-US" smtClean="0"/>
+              <a:rPr lang="en-US"/>
               <a:t>Second level</a:t>
             </a:r>
           </a:p>
           <a:p>
             <a:pPr lvl="2"/>
             <a:r>
-              <a:rPr lang="en-US" smtClean="0"/>
+              <a:rPr lang="en-US"/>
               <a:t>Third level</a:t>
             </a:r>
           </a:p>
           <a:p>
             <a:pPr lvl="3"/>
             <a:r>
-              <a:rPr lang="en-US" smtClean="0"/>
+              <a:rPr lang="en-US"/>
               <a:t>Fourth level</a:t>
             </a:r>
           </a:p>
           <a:p>
             <a:pPr lvl="4"/>
             <a:r>
-              <a:rPr lang="en-US" smtClean="0"/>
+              <a:rPr lang="en-US"/>
               <a:t>Fifth level</a:t>
             </a:r>
             <a:endParaRPr lang="en-US" dirty="0"/>
@@ -578,7 +583,7 @@
           <a:p>
             <a:fld id="{4094A262-D998-1A4D-AA74-601A2F50E65F}" type="datetimeFigureOut">
               <a:rPr lang="en-US" smtClean="0"/>
-              <a:t>9/29/17</a:t>
+              <a:t>9/19/22</a:t>
             </a:fld>
             <a:endParaRPr lang="en-US"/>
           </a:p>
@@ -667,7 +672,7 @@
           <a:lstStyle/>
           <a:p>
             <a:r>
-              <a:rPr lang="en-US" smtClean="0"/>
+              <a:rPr lang="en-US"/>
               <a:t>Click to edit Master title style</a:t>
             </a:r>
             <a:endParaRPr lang="en-US" dirty="0"/>
@@ -691,35 +696,35 @@
           <a:p>
             <a:pPr lvl="0"/>
             <a:r>
-              <a:rPr lang="en-US" smtClean="0"/>
+              <a:rPr lang="en-US"/>
               <a:t>Click to edit Master text styles</a:t>
             </a:r>
           </a:p>
           <a:p>
             <a:pPr lvl="1"/>
             <a:r>
-              <a:rPr lang="en-US" smtClean="0"/>
+              <a:rPr lang="en-US"/>
               <a:t>Second level</a:t>
             </a:r>
           </a:p>
           <a:p>
             <a:pPr lvl="2"/>
             <a:r>
-              <a:rPr lang="en-US" smtClean="0"/>
+              <a:rPr lang="en-US"/>
               <a:t>Third level</a:t>
             </a:r>
           </a:p>
           <a:p>
             <a:pPr lvl="3"/>
             <a:r>
-              <a:rPr lang="en-US" smtClean="0"/>
+              <a:rPr lang="en-US"/>
               <a:t>Fourth level</a:t>
             </a:r>
           </a:p>
           <a:p>
             <a:pPr lvl="4"/>
             <a:r>
-              <a:rPr lang="en-US" smtClean="0"/>
+              <a:rPr lang="en-US"/>
               <a:t>Fifth level</a:t>
             </a:r>
             <a:endParaRPr lang="en-US" dirty="0"/>
@@ -743,7 +748,7 @@
           <a:p>
             <a:fld id="{4094A262-D998-1A4D-AA74-601A2F50E65F}" type="datetimeFigureOut">
               <a:rPr lang="en-US" smtClean="0"/>
-              <a:t>9/29/17</a:t>
+              <a:t>9/19/22</a:t>
             </a:fld>
             <a:endParaRPr lang="en-US"/>
           </a:p>
@@ -841,7 +846,7 @@
           </a:lstStyle>
           <a:p>
             <a:r>
-              <a:rPr lang="en-US" smtClean="0"/>
+              <a:rPr lang="en-US"/>
               <a:t>Click to edit Master title style</a:t>
             </a:r>
             <a:endParaRPr lang="en-US" dirty="0"/>
@@ -961,7 +966,7 @@
           <a:p>
             <a:pPr lvl="0"/>
             <a:r>
-              <a:rPr lang="en-US" smtClean="0"/>
+              <a:rPr lang="en-US"/>
               <a:t>Click to edit Master text styles</a:t>
             </a:r>
           </a:p>
@@ -984,7 +989,7 @@
           <a:p>
             <a:fld id="{4094A262-D998-1A4D-AA74-601A2F50E65F}" type="datetimeFigureOut">
               <a:rPr lang="en-US" smtClean="0"/>
-              <a:t>9/29/17</a:t>
+              <a:t>9/19/22</a:t>
             </a:fld>
             <a:endParaRPr lang="en-US"/>
           </a:p>
@@ -1073,7 +1078,7 @@
           <a:lstStyle/>
           <a:p>
             <a:r>
-              <a:rPr lang="en-US" smtClean="0"/>
+              <a:rPr lang="en-US"/>
               <a:t>Click to edit Master title style</a:t>
             </a:r>
             <a:endParaRPr lang="en-US" dirty="0"/>
@@ -1102,35 +1107,35 @@
           <a:p>
             <a:pPr lvl="0"/>
             <a:r>
-              <a:rPr lang="en-US" smtClean="0"/>
+              <a:rPr lang="en-US"/>
               <a:t>Click to edit Master text styles</a:t>
             </a:r>
           </a:p>
           <a:p>
             <a:pPr lvl="1"/>
             <a:r>
-              <a:rPr lang="en-US" smtClean="0"/>
+              <a:rPr lang="en-US"/>
               <a:t>Second level</a:t>
             </a:r>
           </a:p>
           <a:p>
             <a:pPr lvl="2"/>
             <a:r>
-              <a:rPr lang="en-US" smtClean="0"/>
+              <a:rPr lang="en-US"/>
               <a:t>Third level</a:t>
             </a:r>
           </a:p>
           <a:p>
             <a:pPr lvl="3"/>
             <a:r>
-              <a:rPr lang="en-US" smtClean="0"/>
+              <a:rPr lang="en-US"/>
               <a:t>Fourth level</a:t>
             </a:r>
           </a:p>
           <a:p>
             <a:pPr lvl="4"/>
             <a:r>
-              <a:rPr lang="en-US" smtClean="0"/>
+              <a:rPr lang="en-US"/>
               <a:t>Fifth level</a:t>
             </a:r>
             <a:endParaRPr lang="en-US" dirty="0"/>
@@ -1159,35 +1164,35 @@
           <a:p>
             <a:pPr lvl="0"/>
             <a:r>
-              <a:rPr lang="en-US" smtClean="0"/>
+              <a:rPr lang="en-US"/>
               <a:t>Click to edit Master text styles</a:t>
             </a:r>
           </a:p>
           <a:p>
             <a:pPr lvl="1"/>
             <a:r>
-              <a:rPr lang="en-US" smtClean="0"/>
+              <a:rPr lang="en-US"/>
               <a:t>Second level</a:t>
             </a:r>
           </a:p>
           <a:p>
             <a:pPr lvl="2"/>
             <a:r>
-              <a:rPr lang="en-US" smtClean="0"/>
+              <a:rPr lang="en-US"/>
               <a:t>Third level</a:t>
             </a:r>
           </a:p>
           <a:p>
             <a:pPr lvl="3"/>
             <a:r>
-              <a:rPr lang="en-US" smtClean="0"/>
+              <a:rPr lang="en-US"/>
               <a:t>Fourth level</a:t>
             </a:r>
           </a:p>
           <a:p>
             <a:pPr lvl="4"/>
             <a:r>
-              <a:rPr lang="en-US" smtClean="0"/>
+              <a:rPr lang="en-US"/>
               <a:t>Fifth level</a:t>
             </a:r>
             <a:endParaRPr lang="en-US" dirty="0"/>
@@ -1211,7 +1216,7 @@
           <a:p>
             <a:fld id="{4094A262-D998-1A4D-AA74-601A2F50E65F}" type="datetimeFigureOut">
               <a:rPr lang="en-US" smtClean="0"/>
-              <a:t>9/29/17</a:t>
+              <a:t>9/19/22</a:t>
             </a:fld>
             <a:endParaRPr lang="en-US"/>
           </a:p>
@@ -1305,7 +1310,7 @@
           <a:lstStyle/>
           <a:p>
             <a:r>
-              <a:rPr lang="en-US" smtClean="0"/>
+              <a:rPr lang="en-US"/>
               <a:t>Click to edit Master title style</a:t>
             </a:r>
             <a:endParaRPr lang="en-US" dirty="0"/>
@@ -1371,7 +1376,7 @@
           <a:p>
             <a:pPr lvl="0"/>
             <a:r>
-              <a:rPr lang="en-US" smtClean="0"/>
+              <a:rPr lang="en-US"/>
               <a:t>Click to edit Master text styles</a:t>
             </a:r>
           </a:p>
@@ -1399,35 +1404,35 @@
           <a:p>
             <a:pPr lvl="0"/>
             <a:r>
-              <a:rPr lang="en-US" smtClean="0"/>
+              <a:rPr lang="en-US"/>
               <a:t>Click to edit Master text styles</a:t>
             </a:r>
           </a:p>
           <a:p>
             <a:pPr lvl="1"/>
             <a:r>
-              <a:rPr lang="en-US" smtClean="0"/>
+              <a:rPr lang="en-US"/>
               <a:t>Second level</a:t>
             </a:r>
           </a:p>
           <a:p>
             <a:pPr lvl="2"/>
             <a:r>
-              <a:rPr lang="en-US" smtClean="0"/>
+              <a:rPr lang="en-US"/>
               <a:t>Third level</a:t>
             </a:r>
           </a:p>
           <a:p>
             <a:pPr lvl="3"/>
             <a:r>
-              <a:rPr lang="en-US" smtClean="0"/>
+              <a:rPr lang="en-US"/>
               <a:t>Fourth level</a:t>
             </a:r>
           </a:p>
           <a:p>
             <a:pPr lvl="4"/>
             <a:r>
-              <a:rPr lang="en-US" smtClean="0"/>
+              <a:rPr lang="en-US"/>
               <a:t>Fifth level</a:t>
             </a:r>
             <a:endParaRPr lang="en-US" dirty="0"/>
@@ -1493,7 +1498,7 @@
           <a:p>
             <a:pPr lvl="0"/>
             <a:r>
-              <a:rPr lang="en-US" smtClean="0"/>
+              <a:rPr lang="en-US"/>
               <a:t>Click to edit Master text styles</a:t>
             </a:r>
           </a:p>
@@ -1521,35 +1526,35 @@
           <a:p>
             <a:pPr lvl="0"/>
             <a:r>
-              <a:rPr lang="en-US" smtClean="0"/>
+              <a:rPr lang="en-US"/>
               <a:t>Click to edit Master text styles</a:t>
             </a:r>
           </a:p>
           <a:p>
             <a:pPr lvl="1"/>
             <a:r>
-              <a:rPr lang="en-US" smtClean="0"/>
+              <a:rPr lang="en-US"/>
               <a:t>Second level</a:t>
             </a:r>
           </a:p>
           <a:p>
             <a:pPr lvl="2"/>
             <a:r>
-              <a:rPr lang="en-US" smtClean="0"/>
+              <a:rPr lang="en-US"/>
               <a:t>Third level</a:t>
             </a:r>
           </a:p>
           <a:p>
             <a:pPr lvl="3"/>
             <a:r>
-              <a:rPr lang="en-US" smtClean="0"/>
+              <a:rPr lang="en-US"/>
               <a:t>Fourth level</a:t>
             </a:r>
           </a:p>
           <a:p>
             <a:pPr lvl="4"/>
             <a:r>
-              <a:rPr lang="en-US" smtClean="0"/>
+              <a:rPr lang="en-US"/>
               <a:t>Fifth level</a:t>
             </a:r>
             <a:endParaRPr lang="en-US" dirty="0"/>
@@ -1573,7 +1578,7 @@
           <a:p>
             <a:fld id="{4094A262-D998-1A4D-AA74-601A2F50E65F}" type="datetimeFigureOut">
               <a:rPr lang="en-US" smtClean="0"/>
-              <a:t>9/29/17</a:t>
+              <a:t>9/19/22</a:t>
             </a:fld>
             <a:endParaRPr lang="en-US"/>
           </a:p>
@@ -1662,7 +1667,7 @@
           <a:lstStyle/>
           <a:p>
             <a:r>
-              <a:rPr lang="en-US" smtClean="0"/>
+              <a:rPr lang="en-US"/>
               <a:t>Click to edit Master title style</a:t>
             </a:r>
             <a:endParaRPr lang="en-US" dirty="0"/>
@@ -1686,7 +1691,7 @@
           <a:p>
             <a:fld id="{4094A262-D998-1A4D-AA74-601A2F50E65F}" type="datetimeFigureOut">
               <a:rPr lang="en-US" smtClean="0"/>
-              <a:t>9/29/17</a:t>
+              <a:t>9/19/22</a:t>
             </a:fld>
             <a:endParaRPr lang="en-US"/>
           </a:p>
@@ -1776,7 +1781,7 @@
           <a:p>
             <a:fld id="{4094A262-D998-1A4D-AA74-601A2F50E65F}" type="datetimeFigureOut">
               <a:rPr lang="en-US" smtClean="0"/>
-              <a:t>9/29/17</a:t>
+              <a:t>9/19/22</a:t>
             </a:fld>
             <a:endParaRPr lang="en-US"/>
           </a:p>
@@ -1874,7 +1879,7 @@
           </a:lstStyle>
           <a:p>
             <a:r>
-              <a:rPr lang="en-US" smtClean="0"/>
+              <a:rPr lang="en-US"/>
               <a:t>Click to edit Master title style</a:t>
             </a:r>
             <a:endParaRPr lang="en-US" dirty="0"/>
@@ -1931,35 +1936,35 @@
           <a:p>
             <a:pPr lvl="0"/>
             <a:r>
-              <a:rPr lang="en-US" smtClean="0"/>
+              <a:rPr lang="en-US"/>
               <a:t>Click to edit Master text styles</a:t>
             </a:r>
           </a:p>
           <a:p>
             <a:pPr lvl="1"/>
             <a:r>
-              <a:rPr lang="en-US" smtClean="0"/>
+              <a:rPr lang="en-US"/>
               <a:t>Second level</a:t>
             </a:r>
           </a:p>
           <a:p>
             <a:pPr lvl="2"/>
             <a:r>
-              <a:rPr lang="en-US" smtClean="0"/>
+              <a:rPr lang="en-US"/>
               <a:t>Third level</a:t>
             </a:r>
           </a:p>
           <a:p>
             <a:pPr lvl="3"/>
             <a:r>
-              <a:rPr lang="en-US" smtClean="0"/>
+              <a:rPr lang="en-US"/>
               <a:t>Fourth level</a:t>
             </a:r>
           </a:p>
           <a:p>
             <a:pPr lvl="4"/>
             <a:r>
-              <a:rPr lang="en-US" smtClean="0"/>
+              <a:rPr lang="en-US"/>
               <a:t>Fifth level</a:t>
             </a:r>
             <a:endParaRPr lang="en-US" dirty="0"/>
@@ -2025,7 +2030,7 @@
           <a:p>
             <a:pPr lvl="0"/>
             <a:r>
-              <a:rPr lang="en-US" smtClean="0"/>
+              <a:rPr lang="en-US"/>
               <a:t>Click to edit Master text styles</a:t>
             </a:r>
           </a:p>
@@ -2048,7 +2053,7 @@
           <a:p>
             <a:fld id="{4094A262-D998-1A4D-AA74-601A2F50E65F}" type="datetimeFigureOut">
               <a:rPr lang="en-US" smtClean="0"/>
-              <a:t>9/29/17</a:t>
+              <a:t>9/19/22</a:t>
             </a:fld>
             <a:endParaRPr lang="en-US"/>
           </a:p>
@@ -2146,7 +2151,7 @@
           </a:lstStyle>
           <a:p>
             <a:r>
-              <a:rPr lang="en-US" smtClean="0"/>
+              <a:rPr lang="en-US"/>
               <a:t>Click to edit Master title style</a:t>
             </a:r>
             <a:endParaRPr lang="en-US" dirty="0"/>
@@ -2211,7 +2216,7 @@
           </a:lstStyle>
           <a:p>
             <a:r>
-              <a:rPr lang="en-US" smtClean="0"/>
+              <a:rPr lang="en-US"/>
               <a:t>Drag picture to placeholder or click icon to add</a:t>
             </a:r>
             <a:endParaRPr lang="en-US" dirty="0"/>
@@ -2277,7 +2282,7 @@
           <a:p>
             <a:pPr lvl="0"/>
             <a:r>
-              <a:rPr lang="en-US" smtClean="0"/>
+              <a:rPr lang="en-US"/>
               <a:t>Click to edit Master text styles</a:t>
             </a:r>
           </a:p>
@@ -2300,7 +2305,7 @@
           <a:p>
             <a:fld id="{4094A262-D998-1A4D-AA74-601A2F50E65F}" type="datetimeFigureOut">
               <a:rPr lang="en-US" smtClean="0"/>
-              <a:t>9/29/17</a:t>
+              <a:t>9/19/22</a:t>
             </a:fld>
             <a:endParaRPr lang="en-US"/>
           </a:p>
@@ -2404,7 +2409,7 @@
           <a:lstStyle/>
           <a:p>
             <a:r>
-              <a:rPr lang="en-US" smtClean="0"/>
+              <a:rPr lang="en-US"/>
               <a:t>Click to edit Master title style</a:t>
             </a:r>
             <a:endParaRPr lang="en-US" dirty="0"/>
@@ -2438,35 +2443,35 @@
           <a:p>
             <a:pPr lvl="0"/>
             <a:r>
-              <a:rPr lang="en-US" smtClean="0"/>
+              <a:rPr lang="en-US"/>
               <a:t>Click to edit Master text styles</a:t>
             </a:r>
           </a:p>
           <a:p>
             <a:pPr lvl="1"/>
             <a:r>
-              <a:rPr lang="en-US" smtClean="0"/>
+              <a:rPr lang="en-US"/>
               <a:t>Second level</a:t>
             </a:r>
           </a:p>
           <a:p>
             <a:pPr lvl="2"/>
             <a:r>
-              <a:rPr lang="en-US" smtClean="0"/>
+              <a:rPr lang="en-US"/>
               <a:t>Third level</a:t>
             </a:r>
           </a:p>
           <a:p>
             <a:pPr lvl="3"/>
             <a:r>
-              <a:rPr lang="en-US" smtClean="0"/>
+              <a:rPr lang="en-US"/>
               <a:t>Fourth level</a:t>
             </a:r>
           </a:p>
           <a:p>
             <a:pPr lvl="4"/>
             <a:r>
-              <a:rPr lang="en-US" smtClean="0"/>
+              <a:rPr lang="en-US"/>
               <a:t>Fifth level</a:t>
             </a:r>
             <a:endParaRPr lang="en-US" dirty="0"/>
@@ -2508,7 +2513,7 @@
           <a:p>
             <a:fld id="{4094A262-D998-1A4D-AA74-601A2F50E65F}" type="datetimeFigureOut">
               <a:rPr lang="en-US" smtClean="0"/>
-              <a:t>9/29/17</a:t>
+              <a:t>9/19/22</a:t>
             </a:fld>
             <a:endParaRPr lang="en-US"/>
           </a:p>
@@ -2921,7 +2926,7 @@
         </p:nvSpPr>
         <p:spPr>
           <a:xfrm>
-            <a:off x="503933" y="245059"/>
+            <a:off x="268364" y="165399"/>
             <a:ext cx="1080018" cy="523292"/>
           </a:xfrm>
           <a:prstGeom prst="rect">
@@ -2987,7 +2992,7 @@
         </p:nvSpPr>
         <p:spPr>
           <a:xfrm>
-            <a:off x="1583955" y="245059"/>
+            <a:off x="1347071" y="165399"/>
             <a:ext cx="522515" cy="523292"/>
           </a:xfrm>
           <a:prstGeom prst="rect">
@@ -3042,7 +3047,7 @@
         </p:nvSpPr>
         <p:spPr>
           <a:xfrm>
-            <a:off x="2646475" y="263720"/>
+            <a:off x="2400576" y="165399"/>
             <a:ext cx="1080018" cy="523292"/>
           </a:xfrm>
           <a:prstGeom prst="rect">
@@ -3108,7 +3113,7 @@
         </p:nvSpPr>
         <p:spPr>
           <a:xfrm>
-            <a:off x="3725330" y="263720"/>
+            <a:off x="3480593" y="165399"/>
             <a:ext cx="522515" cy="523292"/>
           </a:xfrm>
           <a:prstGeom prst="rect">
@@ -3163,7 +3168,7 @@
         </p:nvSpPr>
         <p:spPr>
           <a:xfrm>
-            <a:off x="4824005" y="263720"/>
+            <a:off x="4579273" y="165399"/>
             <a:ext cx="1080018" cy="523292"/>
           </a:xfrm>
           <a:prstGeom prst="rect">
@@ -3229,7 +3234,7 @@
         </p:nvSpPr>
         <p:spPr>
           <a:xfrm>
-            <a:off x="5904027" y="263720"/>
+            <a:off x="5658282" y="165399"/>
             <a:ext cx="522515" cy="523292"/>
           </a:xfrm>
           <a:prstGeom prst="rect">
@@ -3284,7 +3289,7 @@
         </p:nvSpPr>
         <p:spPr>
           <a:xfrm>
-            <a:off x="6984041" y="263720"/>
+            <a:off x="6739313" y="165399"/>
             <a:ext cx="1080018" cy="523292"/>
           </a:xfrm>
           <a:prstGeom prst="rect">
@@ -3347,7 +3352,7 @@
         </p:nvSpPr>
         <p:spPr>
           <a:xfrm>
-            <a:off x="8064063" y="263720"/>
+            <a:off x="7819331" y="165399"/>
             <a:ext cx="522515" cy="523292"/>
           </a:xfrm>
           <a:prstGeom prst="rect">
@@ -3387,10 +3392,9 @@
           <a:p>
             <a:pPr algn="ctr"/>
             <a:r>
-              <a:rPr lang="en-US"/>
+              <a:rPr lang="en-US" dirty="0"/>
               <a:t>” </a:t>
             </a:r>
-            <a:endParaRPr lang="en-US" dirty="0"/>
           </a:p>
         </p:txBody>
       </p:sp>
@@ -3398,14 +3402,15 @@
         <p:nvCxnSpPr>
           <p:cNvPr id="20" name="Straight Connector 19"/>
           <p:cNvCxnSpPr>
+            <a:cxnSpLocks/>
             <a:endCxn id="7" idx="1"/>
           </p:cNvCxnSpPr>
           <p:nvPr/>
         </p:nvCxnSpPr>
         <p:spPr>
           <a:xfrm>
-            <a:off x="1824658" y="506706"/>
-            <a:ext cx="821821" cy="18660"/>
+            <a:off x="1608328" y="427045"/>
+            <a:ext cx="792248" cy="0"/>
           </a:xfrm>
           <a:prstGeom prst="line">
             <a:avLst/>
@@ -3436,13 +3441,16 @@
       <p:cxnSp>
         <p:nvCxnSpPr>
           <p:cNvPr id="23" name="Straight Connector 22"/>
-          <p:cNvCxnSpPr/>
+          <p:cNvCxnSpPr>
+            <a:cxnSpLocks/>
+            <a:endCxn id="9" idx="1"/>
+          </p:cNvCxnSpPr>
           <p:nvPr/>
         </p:nvCxnSpPr>
         <p:spPr>
           <a:xfrm>
-            <a:off x="3973809" y="506706"/>
-            <a:ext cx="821821" cy="18660"/>
+            <a:off x="3740842" y="427045"/>
+            <a:ext cx="838431" cy="0"/>
           </a:xfrm>
           <a:prstGeom prst="line">
             <a:avLst/>
@@ -3473,13 +3481,16 @@
       <p:cxnSp>
         <p:nvCxnSpPr>
           <p:cNvPr id="24" name="Straight Connector 23"/>
-          <p:cNvCxnSpPr/>
+          <p:cNvCxnSpPr>
+            <a:cxnSpLocks/>
+            <a:endCxn id="11" idx="1"/>
+          </p:cNvCxnSpPr>
           <p:nvPr/>
         </p:nvCxnSpPr>
         <p:spPr>
           <a:xfrm>
-            <a:off x="6152869" y="525366"/>
-            <a:ext cx="821821" cy="18660"/>
+            <a:off x="5919539" y="427045"/>
+            <a:ext cx="819774" cy="0"/>
           </a:xfrm>
           <a:prstGeom prst="line">
             <a:avLst/>
@@ -3507,6 +3518,86 @@
           </a:fontRef>
         </p:style>
       </p:cxnSp>
+      <p:cxnSp>
+        <p:nvCxnSpPr>
+          <p:cNvPr id="2" name="Straight Connector 1">
+            <a:extLst>
+              <a:ext uri="{FF2B5EF4-FFF2-40B4-BE49-F238E27FC236}">
+                <a16:creationId xmlns:a16="http://schemas.microsoft.com/office/drawing/2014/main" id="{9D3B1D24-43AA-5A41-E40D-B257A316081D}"/>
+              </a:ext>
+            </a:extLst>
+          </p:cNvPr>
+          <p:cNvCxnSpPr>
+            <a:cxnSpLocks/>
+          </p:cNvCxnSpPr>
+          <p:nvPr/>
+        </p:nvCxnSpPr>
+        <p:spPr>
+          <a:xfrm>
+            <a:off x="8080588" y="427045"/>
+            <a:ext cx="540216" cy="0"/>
+          </a:xfrm>
+          <a:prstGeom prst="line">
+            <a:avLst/>
+          </a:prstGeom>
+          <a:ln w="50800">
+            <a:solidFill>
+              <a:schemeClr val="tx1"/>
+            </a:solidFill>
+            <a:headEnd type="oval"/>
+            <a:tailEnd type="none"/>
+          </a:ln>
+        </p:spPr>
+        <p:style>
+          <a:lnRef idx="1">
+            <a:schemeClr val="accent1"/>
+          </a:lnRef>
+          <a:fillRef idx="0">
+            <a:schemeClr val="accent1"/>
+          </a:fillRef>
+          <a:effectRef idx="0">
+            <a:schemeClr val="accent1"/>
+          </a:effectRef>
+          <a:fontRef idx="minor">
+            <a:schemeClr val="tx1"/>
+          </a:fontRef>
+        </p:style>
+      </p:cxnSp>
+      <p:sp>
+        <p:nvSpPr>
+          <p:cNvPr id="3" name="TextBox 2">
+            <a:extLst>
+              <a:ext uri="{FF2B5EF4-FFF2-40B4-BE49-F238E27FC236}">
+                <a16:creationId xmlns:a16="http://schemas.microsoft.com/office/drawing/2014/main" id="{03E9927A-9710-D111-F050-213FE6CBD5A6}"/>
+              </a:ext>
+            </a:extLst>
+          </p:cNvPr>
+          <p:cNvSpPr txBox="1"/>
+          <p:nvPr/>
+        </p:nvSpPr>
+        <p:spPr>
+          <a:xfrm>
+            <a:off x="8256976" y="207075"/>
+            <a:ext cx="718466" cy="1015663"/>
+          </a:xfrm>
+          <a:prstGeom prst="rect">
+            <a:avLst/>
+          </a:prstGeom>
+          <a:noFill/>
+        </p:spPr>
+        <p:txBody>
+          <a:bodyPr wrap="none" rtlCol="0">
+            <a:spAutoFit/>
+          </a:bodyPr>
+          <a:lstStyle/>
+          <a:p>
+            <a:r>
+              <a:rPr lang="en-GB" sz="6000" dirty="0"/>
+              <a:t>⏚</a:t>
+            </a:r>
+          </a:p>
+        </p:txBody>
+      </p:sp>
     </p:spTree>
     <p:extLst>
       <p:ext uri="{BB962C8B-B14F-4D97-AF65-F5344CB8AC3E}">

</xml_diff>